<commit_message>
fixed template and fixed resize function
</commit_message>
<xml_diff>
--- a/assets/template.pptx
+++ b/assets/template.pptx
@@ -715,17 +715,17 @@
         </p:nvSpPr>
         <p:spPr>
           <a:xfrm>
-            <a:off x="1295400" y="93349"/>
-            <a:ext cx="9601200" cy="436490"/>
+            <a:off x="1295400" y="23012"/>
+            <a:ext cx="9601200" cy="249553"/>
           </a:xfrm>
         </p:spPr>
         <p:txBody>
           <a:bodyPr>
-            <a:normAutofit/>
+            <a:noAutofit/>
           </a:bodyPr>
           <a:lstStyle>
             <a:lvl1pPr algn="ctr">
-              <a:defRPr sz="2400"/>
+              <a:defRPr sz="1800"/>
             </a:lvl1pPr>
           </a:lstStyle>
           <a:p>
@@ -755,8 +755,8 @@
         </p:nvSpPr>
         <p:spPr>
           <a:xfrm>
-            <a:off x="1295400" y="598206"/>
-            <a:ext cx="10275888" cy="5802594"/>
+            <a:off x="1069731" y="342903"/>
+            <a:ext cx="10727225" cy="6242534"/>
           </a:xfrm>
         </p:spPr>
         <p:txBody>
@@ -789,27 +789,41 @@
         </p:nvSpPr>
         <p:spPr>
           <a:xfrm>
-            <a:off x="3109119" y="6469167"/>
-            <a:ext cx="6648450" cy="295484"/>
+            <a:off x="3109118" y="6585437"/>
+            <a:ext cx="6648450" cy="195113"/>
           </a:xfrm>
         </p:spPr>
         <p:txBody>
-          <a:bodyPr/>
+          <a:bodyPr>
+            <a:noAutofit/>
+          </a:bodyPr>
           <a:lstStyle>
             <a:lvl1pPr marL="0" indent="0" algn="ctr">
               <a:buNone/>
-              <a:defRPr>
+              <a:defRPr sz="1400">
                 <a:solidFill>
                   <a:srgbClr val="FF0000"/>
                 </a:solidFill>
               </a:defRPr>
             </a:lvl1pPr>
+            <a:lvl2pPr>
+              <a:defRPr sz="1600"/>
+            </a:lvl2pPr>
+            <a:lvl3pPr>
+              <a:defRPr sz="1600"/>
+            </a:lvl3pPr>
+            <a:lvl4pPr>
+              <a:defRPr sz="1600"/>
+            </a:lvl4pPr>
+            <a:lvl5pPr>
+              <a:defRPr sz="1600"/>
+            </a:lvl5pPr>
           </a:lstStyle>
           <a:p>
             <a:pPr lvl="0"/>
             <a:r>
               <a:rPr lang="en-US" dirty="0"/>
-              <a:t>Text</a:t>
+              <a:t>Click to add text</a:t>
             </a:r>
           </a:p>
           <a:p>
@@ -1829,7 +1843,7 @@
   <a:extraClrSchemeLst/>
   <a:extLst>
     <a:ext uri="{05A4C25C-085E-4340-85A3-A5531E510DB2}">
-      <thm15:themeFamily xmlns:thm15="http://schemas.microsoft.com/office/thememl/2012/main" name="template.potx" id="{507256CC-F373-40D7-802F-58675480201B}" vid="{72E05174-F836-4D65-B98F-478270BAA898}"/>
+      <thm15:themeFamily xmlns:thm15="http://schemas.microsoft.com/office/thememl/2012/main" name="template.potx" id="{EF8C890B-8A77-4D1C-8D74-2E35B3EEB624}" vid="{9A1D34F2-3D2D-4717-9D55-B03A5A954F5C}"/>
     </a:ext>
   </a:extLst>
 </a:theme>

</xml_diff>